<commit_message>
Product Listing PPT Modified.
</commit_message>
<xml_diff>
--- a/docs/misc/Product_Listing.pptx
+++ b/docs/misc/Product_Listing.pptx
@@ -11,6 +11,7 @@
     <p:sldId id="259" r:id="rId5"/>
     <p:sldId id="260" r:id="rId6"/>
     <p:sldId id="261" r:id="rId7"/>
+    <p:sldId id="262" r:id="rId8"/>
   </p:sldIdLst>
   <p:sldSz cx="9144000" cy="6858000" type="screen4x3"/>
   <p:notesSz cx="6858000" cy="9144000"/>
@@ -293,7 +294,7 @@
           <a:p>
             <a:fld id="{764ADEE5-27C1-49B9-9F99-2A645B0B24A4}" type="datetimeFigureOut">
               <a:rPr lang="en-US" smtClean="0"/>
-              <a:t>11/19/2015</a:t>
+              <a:t>12/7/2015</a:t>
             </a:fld>
             <a:endParaRPr lang="en-US"/>
           </a:p>
@@ -463,7 +464,7 @@
           <a:p>
             <a:fld id="{764ADEE5-27C1-49B9-9F99-2A645B0B24A4}" type="datetimeFigureOut">
               <a:rPr lang="en-US" smtClean="0"/>
-              <a:t>11/19/2015</a:t>
+              <a:t>12/7/2015</a:t>
             </a:fld>
             <a:endParaRPr lang="en-US"/>
           </a:p>
@@ -643,7 +644,7 @@
           <a:p>
             <a:fld id="{764ADEE5-27C1-49B9-9F99-2A645B0B24A4}" type="datetimeFigureOut">
               <a:rPr lang="en-US" smtClean="0"/>
-              <a:t>11/19/2015</a:t>
+              <a:t>12/7/2015</a:t>
             </a:fld>
             <a:endParaRPr lang="en-US"/>
           </a:p>
@@ -813,7 +814,7 @@
           <a:p>
             <a:fld id="{764ADEE5-27C1-49B9-9F99-2A645B0B24A4}" type="datetimeFigureOut">
               <a:rPr lang="en-US" smtClean="0"/>
-              <a:t>11/19/2015</a:t>
+              <a:t>12/7/2015</a:t>
             </a:fld>
             <a:endParaRPr lang="en-US"/>
           </a:p>
@@ -1059,7 +1060,7 @@
           <a:p>
             <a:fld id="{764ADEE5-27C1-49B9-9F99-2A645B0B24A4}" type="datetimeFigureOut">
               <a:rPr lang="en-US" smtClean="0"/>
-              <a:t>11/19/2015</a:t>
+              <a:t>12/7/2015</a:t>
             </a:fld>
             <a:endParaRPr lang="en-US"/>
           </a:p>
@@ -1347,7 +1348,7 @@
           <a:p>
             <a:fld id="{764ADEE5-27C1-49B9-9F99-2A645B0B24A4}" type="datetimeFigureOut">
               <a:rPr lang="en-US" smtClean="0"/>
-              <a:t>11/19/2015</a:t>
+              <a:t>12/7/2015</a:t>
             </a:fld>
             <a:endParaRPr lang="en-US"/>
           </a:p>
@@ -1769,7 +1770,7 @@
           <a:p>
             <a:fld id="{764ADEE5-27C1-49B9-9F99-2A645B0B24A4}" type="datetimeFigureOut">
               <a:rPr lang="en-US" smtClean="0"/>
-              <a:t>11/19/2015</a:t>
+              <a:t>12/7/2015</a:t>
             </a:fld>
             <a:endParaRPr lang="en-US"/>
           </a:p>
@@ -1887,7 +1888,7 @@
           <a:p>
             <a:fld id="{764ADEE5-27C1-49B9-9F99-2A645B0B24A4}" type="datetimeFigureOut">
               <a:rPr lang="en-US" smtClean="0"/>
-              <a:t>11/19/2015</a:t>
+              <a:t>12/7/2015</a:t>
             </a:fld>
             <a:endParaRPr lang="en-US"/>
           </a:p>
@@ -1982,7 +1983,7 @@
           <a:p>
             <a:fld id="{764ADEE5-27C1-49B9-9F99-2A645B0B24A4}" type="datetimeFigureOut">
               <a:rPr lang="en-US" smtClean="0"/>
-              <a:t>11/19/2015</a:t>
+              <a:t>12/7/2015</a:t>
             </a:fld>
             <a:endParaRPr lang="en-US"/>
           </a:p>
@@ -2259,7 +2260,7 @@
           <a:p>
             <a:fld id="{764ADEE5-27C1-49B9-9F99-2A645B0B24A4}" type="datetimeFigureOut">
               <a:rPr lang="en-US" smtClean="0"/>
-              <a:t>11/19/2015</a:t>
+              <a:t>12/7/2015</a:t>
             </a:fld>
             <a:endParaRPr lang="en-US"/>
           </a:p>
@@ -2512,7 +2513,7 @@
           <a:p>
             <a:fld id="{764ADEE5-27C1-49B9-9F99-2A645B0B24A4}" type="datetimeFigureOut">
               <a:rPr lang="en-US" smtClean="0"/>
-              <a:t>11/19/2015</a:t>
+              <a:t>12/7/2015</a:t>
             </a:fld>
             <a:endParaRPr lang="en-US"/>
           </a:p>
@@ -2725,7 +2726,7 @@
           <a:p>
             <a:fld id="{764ADEE5-27C1-49B9-9F99-2A645B0B24A4}" type="datetimeFigureOut">
               <a:rPr lang="en-US" smtClean="0"/>
-              <a:t>11/19/2015</a:t>
+              <a:t>12/7/2015</a:t>
             </a:fld>
             <a:endParaRPr lang="en-US"/>
           </a:p>
@@ -3311,7 +3312,7 @@
         <p:spPr>
           <a:xfrm>
             <a:off x="762000" y="152400"/>
-            <a:ext cx="8077200" cy="2308324"/>
+            <a:ext cx="8077200" cy="1569660"/>
           </a:xfrm>
           <a:prstGeom prst="rect">
             <a:avLst/>
@@ -3354,50 +3355,15 @@
               <a:rPr lang="en-US" sz="1200" dirty="0" smtClean="0">
                 <a:hlinkClick r:id="rId5"/>
               </a:rPr>
-              <a:t>http://www.cisco.com/c/en/us/products/routers/product-listing.html</a:t>
+              <a:t>http://www.cisco.com/c/en/us/products/unified-communications/product-listing.html</a:t>
             </a:r>
             <a:endParaRPr lang="en-US" sz="1200" dirty="0" smtClean="0"/>
           </a:p>
           <a:p>
+            <a:pPr lvl="1"/>
             <a:r>
               <a:rPr lang="en-US" sz="1200" dirty="0" smtClean="0">
                 <a:hlinkClick r:id="rId6"/>
-              </a:rPr>
-              <a:t>http://www.cisco.com/c/en/us/products/security/product-listing.html</a:t>
-            </a:r>
-            <a:endParaRPr lang="en-US" sz="1200" dirty="0" smtClean="0"/>
-          </a:p>
-          <a:p>
-            <a:r>
-              <a:rPr lang="en-US" sz="1200" dirty="0" smtClean="0">
-                <a:hlinkClick r:id="rId7"/>
-              </a:rPr>
-              <a:t>http://www.cisco.com/c/en/us/products/switches/product-listing.html</a:t>
-            </a:r>
-            <a:endParaRPr lang="en-US" sz="1200" dirty="0" smtClean="0"/>
-          </a:p>
-          <a:p>
-            <a:r>
-              <a:rPr lang="en-US" sz="1200" dirty="0" smtClean="0">
-                <a:hlinkClick r:id="rId8"/>
-              </a:rPr>
-              <a:t>http://www.cisco.com/c/en/us/products/unified-communications/product-listing.html</a:t>
-            </a:r>
-            <a:endParaRPr lang="en-US" sz="1200" dirty="0" smtClean="0"/>
-          </a:p>
-          <a:p>
-            <a:r>
-              <a:rPr lang="en-US" sz="1200" dirty="0" smtClean="0">
-                <a:hlinkClick r:id="rId9"/>
-              </a:rPr>
-              <a:t>http://www.cisco.com/c/en/us/products/wireless/product-listing.html</a:t>
-            </a:r>
-            <a:endParaRPr lang="en-US" sz="1200" dirty="0" smtClean="0"/>
-          </a:p>
-          <a:p>
-            <a:r>
-              <a:rPr lang="en-US" sz="1200" dirty="0" smtClean="0">
-                <a:hlinkClick r:id="rId10"/>
               </a:rPr>
               <a:t>http://www.cisco.com/c/en/us/solutions/service-provider/product-listing.html</a:t>
             </a:r>
@@ -3822,6 +3788,139 @@
     <p:extLst>
       <p:ext uri="{BB962C8B-B14F-4D97-AF65-F5344CB8AC3E}">
         <p14:creationId xmlns:p14="http://schemas.microsoft.com/office/powerpoint/2010/main" val="2305478445"/>
+      </p:ext>
+    </p:extLst>
+  </p:cSld>
+  <p:clrMapOvr>
+    <a:masterClrMapping/>
+  </p:clrMapOvr>
+</p:sld>
+</file>
+
+<file path=ppt/slides/slide7.xml><?xml version="1.0" encoding="utf-8"?>
+<p:sld xmlns:a="http://schemas.openxmlformats.org/drawingml/2006/main" xmlns:r="http://schemas.openxmlformats.org/officeDocument/2006/relationships" xmlns:p="http://schemas.openxmlformats.org/presentationml/2006/main">
+  <p:cSld>
+    <p:spTree>
+      <p:nvGrpSpPr>
+        <p:cNvPr id="1" name=""/>
+        <p:cNvGrpSpPr/>
+        <p:nvPr/>
+      </p:nvGrpSpPr>
+      <p:grpSpPr>
+        <a:xfrm>
+          <a:off x="0" y="0"/>
+          <a:ext cx="0" cy="0"/>
+          <a:chOff x="0" y="0"/>
+          <a:chExt cx="0" cy="0"/>
+        </a:xfrm>
+      </p:grpSpPr>
+      <p:pic>
+        <p:nvPicPr>
+          <p:cNvPr id="1026" name="Picture 2"/>
+          <p:cNvPicPr>
+            <a:picLocks noChangeAspect="1" noChangeArrowheads="1"/>
+          </p:cNvPicPr>
+          <p:nvPr/>
+        </p:nvPicPr>
+        <p:blipFill rotWithShape="1">
+          <a:blip r:embed="rId2">
+            <a:extLst>
+              <a:ext uri="{28A0092B-C50C-407E-A947-70E740481C1C}">
+                <a14:useLocalDpi xmlns:a14="http://schemas.microsoft.com/office/drawing/2010/main" val="0"/>
+              </a:ext>
+            </a:extLst>
+          </a:blip>
+          <a:srcRect l="-132" t="-1457" r="25362" b="26902"/>
+          <a:stretch/>
+        </p:blipFill>
+        <p:spPr bwMode="auto">
+          <a:xfrm>
+            <a:off x="304800" y="1219200"/>
+            <a:ext cx="7862454" cy="5124450"/>
+          </a:xfrm>
+          <a:prstGeom prst="rect">
+            <a:avLst/>
+          </a:prstGeom>
+          <a:noFill/>
+          <a:ln>
+            <a:noFill/>
+          </a:ln>
+          <a:effectLst/>
+          <a:extLst>
+            <a:ext uri="{909E8E84-426E-40DD-AFC4-6F175D3DCCD1}">
+              <a14:hiddenFill xmlns:a14="http://schemas.microsoft.com/office/drawing/2010/main">
+                <a:solidFill>
+                  <a:schemeClr val="accent1"/>
+                </a:solidFill>
+              </a14:hiddenFill>
+            </a:ext>
+            <a:ext uri="{91240B29-F687-4F45-9708-019B960494DF}">
+              <a14:hiddenLine xmlns:a14="http://schemas.microsoft.com/office/drawing/2010/main" w="9525">
+                <a:solidFill>
+                  <a:schemeClr val="tx1"/>
+                </a:solidFill>
+                <a:miter lim="800000"/>
+                <a:headEnd/>
+                <a:tailEnd/>
+              </a14:hiddenLine>
+            </a:ext>
+            <a:ext uri="{AF507438-7753-43E0-B8FC-AC1667EBCBE1}">
+              <a14:hiddenEffects xmlns:a14="http://schemas.microsoft.com/office/drawing/2010/main">
+                <a:effectLst>
+                  <a:outerShdw dist="35921" dir="2700000" algn="ctr" rotWithShape="0">
+                    <a:schemeClr val="bg2"/>
+                  </a:outerShdw>
+                </a:effectLst>
+              </a14:hiddenEffects>
+            </a:ext>
+          </a:extLst>
+        </p:spPr>
+      </p:pic>
+      <p:sp>
+        <p:nvSpPr>
+          <p:cNvPr id="2" name="TextBox 1"/>
+          <p:cNvSpPr txBox="1"/>
+          <p:nvPr/>
+        </p:nvSpPr>
+        <p:spPr>
+          <a:xfrm>
+            <a:off x="900544" y="475565"/>
+            <a:ext cx="7633855" cy="646331"/>
+          </a:xfrm>
+          <a:prstGeom prst="rect">
+            <a:avLst/>
+          </a:prstGeom>
+          <a:noFill/>
+        </p:spPr>
+        <p:txBody>
+          <a:bodyPr wrap="square" rtlCol="0">
+            <a:spAutoFit/>
+          </a:bodyPr>
+          <a:lstStyle/>
+          <a:p>
+            <a:r>
+              <a:rPr lang="en-US" dirty="0">
+                <a:hlinkClick r:id="rId3"/>
+              </a:rPr>
+              <a:t>http://</a:t>
+            </a:r>
+            <a:r>
+              <a:rPr lang="en-US" dirty="0" smtClean="0">
+                <a:hlinkClick r:id="rId3"/>
+              </a:rPr>
+              <a:t>www.cisco.com/c/en/us/solutions/service-provider/product-listing.html</a:t>
+            </a:r>
+            <a:endParaRPr lang="en-US" dirty="0" smtClean="0"/>
+          </a:p>
+          <a:p>
+            <a:endParaRPr lang="en-US" dirty="0"/>
+          </a:p>
+        </p:txBody>
+      </p:sp>
+    </p:spTree>
+    <p:extLst>
+      <p:ext uri="{BB962C8B-B14F-4D97-AF65-F5344CB8AC3E}">
+        <p14:creationId xmlns:p14="http://schemas.microsoft.com/office/powerpoint/2010/main" val="2954110848"/>
       </p:ext>
     </p:extLst>
   </p:cSld>

</xml_diff>

<commit_message>
PPT Slide modified with added variation. Removed URL in the firt Slide.
</commit_message>
<xml_diff>
--- a/docs/misc/Product_Listing.pptx
+++ b/docs/misc/Product_Listing.pptx
@@ -112,7 +112,7 @@
   </p:defaultTextStyle>
   <p:extLst>
     <p:ext uri="{EFAFB233-063F-42B5-8137-9DF3F51BA10A}">
-      <p15:sldGuideLst xmlns:p15="http://schemas.microsoft.com/office/powerpoint/2012/main">
+      <p15:sldGuideLst xmlns:p15="http://schemas.microsoft.com/office/powerpoint/2012/main" xmlns="">
         <p15:guide id="1" orient="horz" pos="2160">
           <p15:clr>
             <a:srgbClr val="A4A3A4"/>
@@ -310,7 +310,7 @@
           <a:p>
             <a:fld id="{764ADEE5-27C1-49B9-9F99-2A645B0B24A4}" type="datetimeFigureOut">
               <a:rPr lang="en-US" smtClean="0"/>
-              <a:t>12/9/2015</a:t>
+              <a:t>12/10/2015</a:t>
             </a:fld>
             <a:endParaRPr lang="en-US"/>
           </a:p>
@@ -480,7 +480,7 @@
           <a:p>
             <a:fld id="{764ADEE5-27C1-49B9-9F99-2A645B0B24A4}" type="datetimeFigureOut">
               <a:rPr lang="en-US" smtClean="0"/>
-              <a:t>12/9/2015</a:t>
+              <a:t>12/10/2015</a:t>
             </a:fld>
             <a:endParaRPr lang="en-US"/>
           </a:p>
@@ -660,7 +660,7 @@
           <a:p>
             <a:fld id="{764ADEE5-27C1-49B9-9F99-2A645B0B24A4}" type="datetimeFigureOut">
               <a:rPr lang="en-US" smtClean="0"/>
-              <a:t>12/9/2015</a:t>
+              <a:t>12/10/2015</a:t>
             </a:fld>
             <a:endParaRPr lang="en-US"/>
           </a:p>
@@ -830,7 +830,7 @@
           <a:p>
             <a:fld id="{764ADEE5-27C1-49B9-9F99-2A645B0B24A4}" type="datetimeFigureOut">
               <a:rPr lang="en-US" smtClean="0"/>
-              <a:t>12/9/2015</a:t>
+              <a:t>12/10/2015</a:t>
             </a:fld>
             <a:endParaRPr lang="en-US"/>
           </a:p>
@@ -1076,7 +1076,7 @@
           <a:p>
             <a:fld id="{764ADEE5-27C1-49B9-9F99-2A645B0B24A4}" type="datetimeFigureOut">
               <a:rPr lang="en-US" smtClean="0"/>
-              <a:t>12/9/2015</a:t>
+              <a:t>12/10/2015</a:t>
             </a:fld>
             <a:endParaRPr lang="en-US"/>
           </a:p>
@@ -1364,7 +1364,7 @@
           <a:p>
             <a:fld id="{764ADEE5-27C1-49B9-9F99-2A645B0B24A4}" type="datetimeFigureOut">
               <a:rPr lang="en-US" smtClean="0"/>
-              <a:t>12/9/2015</a:t>
+              <a:t>12/10/2015</a:t>
             </a:fld>
             <a:endParaRPr lang="en-US"/>
           </a:p>
@@ -1786,7 +1786,7 @@
           <a:p>
             <a:fld id="{764ADEE5-27C1-49B9-9F99-2A645B0B24A4}" type="datetimeFigureOut">
               <a:rPr lang="en-US" smtClean="0"/>
-              <a:t>12/9/2015</a:t>
+              <a:t>12/10/2015</a:t>
             </a:fld>
             <a:endParaRPr lang="en-US"/>
           </a:p>
@@ -1904,7 +1904,7 @@
           <a:p>
             <a:fld id="{764ADEE5-27C1-49B9-9F99-2A645B0B24A4}" type="datetimeFigureOut">
               <a:rPr lang="en-US" smtClean="0"/>
-              <a:t>12/9/2015</a:t>
+              <a:t>12/10/2015</a:t>
             </a:fld>
             <a:endParaRPr lang="en-US"/>
           </a:p>
@@ -1999,7 +1999,7 @@
           <a:p>
             <a:fld id="{764ADEE5-27C1-49B9-9F99-2A645B0B24A4}" type="datetimeFigureOut">
               <a:rPr lang="en-US" smtClean="0"/>
-              <a:t>12/9/2015</a:t>
+              <a:t>12/10/2015</a:t>
             </a:fld>
             <a:endParaRPr lang="en-US"/>
           </a:p>
@@ -2276,7 +2276,7 @@
           <a:p>
             <a:fld id="{764ADEE5-27C1-49B9-9F99-2A645B0B24A4}" type="datetimeFigureOut">
               <a:rPr lang="en-US" smtClean="0"/>
-              <a:t>12/9/2015</a:t>
+              <a:t>12/10/2015</a:t>
             </a:fld>
             <a:endParaRPr lang="en-US"/>
           </a:p>
@@ -2529,7 +2529,7 @@
           <a:p>
             <a:fld id="{764ADEE5-27C1-49B9-9F99-2A645B0B24A4}" type="datetimeFigureOut">
               <a:rPr lang="en-US" smtClean="0"/>
-              <a:t>12/9/2015</a:t>
+              <a:t>12/10/2015</a:t>
             </a:fld>
             <a:endParaRPr lang="en-US"/>
           </a:p>
@@ -2742,7 +2742,7 @@
           <a:p>
             <a:fld id="{764ADEE5-27C1-49B9-9F99-2A645B0B24A4}" type="datetimeFigureOut">
               <a:rPr lang="en-US" smtClean="0"/>
-              <a:t>12/9/2015</a:t>
+              <a:t>12/10/2015</a:t>
             </a:fld>
             <a:endParaRPr lang="en-US"/>
           </a:p>
@@ -3328,7 +3328,7 @@
         <p:spPr>
           <a:xfrm>
             <a:off x="762000" y="152400"/>
-            <a:ext cx="8077200" cy="1569660"/>
+            <a:ext cx="8077200" cy="1384995"/>
           </a:xfrm>
           <a:prstGeom prst="rect">
             <a:avLst/>
@@ -3371,17 +3371,13 @@
               <a:rPr lang="en-US" sz="1200" dirty="0" smtClean="0">
                 <a:hlinkClick r:id="rId5"/>
               </a:rPr>
-              <a:t>http://www.cisco.com/c/en/us/products/unified-communications/product-listing.html</a:t>
-            </a:r>
-            <a:endParaRPr lang="en-US" sz="1200" dirty="0" smtClean="0"/>
-          </a:p>
-          <a:p>
-            <a:pPr lvl="1"/>
+              <a:t>http://</a:t>
+            </a:r>
             <a:r>
               <a:rPr lang="en-US" sz="1200" dirty="0" smtClean="0">
-                <a:hlinkClick r:id="rId6"/>
+                <a:hlinkClick r:id="rId5"/>
               </a:rPr>
-              <a:t>http://www.cisco.com/c/en/us/solutions/service-provider/product-listing.html</a:t>
+              <a:t>www.cisco.com/c/en/us/products/unified-communications/product-listing.html</a:t>
             </a:r>
             <a:endParaRPr lang="en-US" sz="1200" dirty="0" smtClean="0"/>
           </a:p>

</xml_diff>